<commit_message>
Added Example Files for darker IPhone
</commit_message>
<xml_diff>
--- a/ToDoWireFrame.pptx
+++ b/ToDoWireFrame.pptx
@@ -9,7 +9,7 @@
   </p:notesMasterIdLst>
   <p:sldIdLst>
     <p:sldId id="264" r:id="rId2"/>
-    <p:sldId id="282" r:id="rId3"/>
+    <p:sldId id="285" r:id="rId3"/>
     <p:sldId id="265" r:id="rId4"/>
     <p:sldId id="272" r:id="rId5"/>
     <p:sldId id="268" r:id="rId6"/>
@@ -3459,761 +3459,688 @@
           <a:chExt cx="0" cy="0"/>
         </a:xfrm>
       </p:grpSpPr>
+      <p:pic>
+        <p:nvPicPr>
+          <p:cNvPr id="2" name="Picture 1"/>
+          <p:cNvPicPr>
+            <a:picLocks noChangeAspect="1"/>
+          </p:cNvPicPr>
+          <p:nvPr/>
+        </p:nvPicPr>
+        <p:blipFill>
+          <a:blip r:embed="rId2">
+            <a:extLst>
+              <a:ext uri="{28A0092B-C50C-407E-A947-70E740481C1C}">
+                <a14:useLocalDpi xmlns:a14="http://schemas.microsoft.com/office/drawing/2010/main" val="0"/>
+              </a:ext>
+            </a:extLst>
+          </a:blip>
+          <a:stretch>
+            <a:fillRect/>
+          </a:stretch>
+        </p:blipFill>
+        <p:spPr>
+          <a:xfrm>
+            <a:off x="5251105" y="168555"/>
+            <a:ext cx="3035346" cy="6477000"/>
+          </a:xfrm>
+          <a:prstGeom prst="rect">
+            <a:avLst/>
+          </a:prstGeom>
+        </p:spPr>
+      </p:pic>
+      <p:sp>
+        <p:nvSpPr>
+          <p:cNvPr id="3" name="Rectangle 2"/>
+          <p:cNvSpPr/>
+          <p:nvPr/>
+        </p:nvSpPr>
+        <p:spPr>
+          <a:xfrm>
+            <a:off x="5479705" y="5083455"/>
+            <a:ext cx="2667000" cy="630942"/>
+          </a:xfrm>
+          <a:prstGeom prst="rect">
+            <a:avLst/>
+          </a:prstGeom>
+        </p:spPr>
+        <p:txBody>
+          <a:bodyPr wrap="square">
+            <a:spAutoFit/>
+          </a:bodyPr>
+          <a:lstStyle/>
+          <a:p>
+            <a:pPr algn="ctr"/>
+            <a:r>
+              <a:rPr lang="en-US" sz="1000" b="0" i="0" dirty="0" smtClean="0">
+                <a:solidFill>
+                  <a:schemeClr val="tx1">
+                    <a:lumMod val="85000"/>
+                    <a:lumOff val="15000"/>
+                  </a:schemeClr>
+                </a:solidFill>
+                <a:effectLst/>
+                <a:latin typeface="Arial" panose="020B0604020202020204" pitchFamily="34" charset="0"/>
+                <a:cs typeface="Arial" panose="020B0604020202020204" pitchFamily="34" charset="0"/>
+              </a:rPr>
+              <a:t>Double-click a </a:t>
+            </a:r>
+            <a:r>
+              <a:rPr lang="en-US" sz="1000" b="0" i="0" dirty="0" err="1" smtClean="0">
+                <a:solidFill>
+                  <a:schemeClr val="tx1">
+                    <a:lumMod val="85000"/>
+                    <a:lumOff val="15000"/>
+                  </a:schemeClr>
+                </a:solidFill>
+                <a:effectLst/>
+                <a:latin typeface="Arial" panose="020B0604020202020204" pitchFamily="34" charset="0"/>
+                <a:cs typeface="Arial" panose="020B0604020202020204" pitchFamily="34" charset="0"/>
+              </a:rPr>
+              <a:t>ToDo</a:t>
+            </a:r>
+            <a:r>
+              <a:rPr lang="en-US" sz="1000" b="0" i="0" dirty="0" smtClean="0">
+                <a:solidFill>
+                  <a:schemeClr val="tx1">
+                    <a:lumMod val="85000"/>
+                    <a:lumOff val="15000"/>
+                  </a:schemeClr>
+                </a:solidFill>
+                <a:effectLst/>
+                <a:latin typeface="Arial" panose="020B0604020202020204" pitchFamily="34" charset="0"/>
+                <a:cs typeface="Arial" panose="020B0604020202020204" pitchFamily="34" charset="0"/>
+              </a:rPr>
+              <a:t> item to edit it</a:t>
+            </a:r>
+          </a:p>
+          <a:p>
+            <a:pPr algn="ctr"/>
+            <a:endParaRPr lang="en-US" sz="900" b="0" i="0" dirty="0" smtClean="0">
+              <a:solidFill>
+                <a:schemeClr val="tx1">
+                  <a:lumMod val="85000"/>
+                  <a:lumOff val="15000"/>
+                </a:schemeClr>
+              </a:solidFill>
+              <a:effectLst/>
+              <a:latin typeface="Arial" panose="020B0604020202020204" pitchFamily="34" charset="0"/>
+              <a:cs typeface="Arial" panose="020B0604020202020204" pitchFamily="34" charset="0"/>
+            </a:endParaRPr>
+          </a:p>
+          <a:p>
+            <a:pPr algn="ctr"/>
+            <a:r>
+              <a:rPr lang="en-US" sz="800" b="0" i="0" dirty="0" smtClean="0">
+                <a:solidFill>
+                  <a:schemeClr val="tx1">
+                    <a:lumMod val="50000"/>
+                    <a:lumOff val="50000"/>
+                  </a:schemeClr>
+                </a:solidFill>
+                <a:effectLst/>
+                <a:latin typeface="Arial" panose="020B0604020202020204" pitchFamily="34" charset="0"/>
+                <a:cs typeface="Arial" panose="020B0604020202020204" pitchFamily="34" charset="0"/>
+              </a:rPr>
+              <a:t>Created by</a:t>
+            </a:r>
+            <a:r>
+              <a:rPr lang="en-US" sz="800" b="0" i="0" dirty="0" smtClean="0">
+                <a:solidFill>
+                  <a:srgbClr val="A6A6A6"/>
+                </a:solidFill>
+                <a:effectLst/>
+                <a:latin typeface="Arial" panose="020B0604020202020204" pitchFamily="34" charset="0"/>
+                <a:cs typeface="Arial" panose="020B0604020202020204" pitchFamily="34" charset="0"/>
+              </a:rPr>
+              <a:t> </a:t>
+            </a:r>
+            <a:r>
+              <a:rPr lang="en-US" sz="800" b="0" i="0" u="sng" dirty="0" smtClean="0">
+                <a:solidFill>
+                  <a:srgbClr val="3D6CBC"/>
+                </a:solidFill>
+                <a:effectLst/>
+                <a:latin typeface="Arial" panose="020B0604020202020204" pitchFamily="34" charset="0"/>
+                <a:cs typeface="Arial" panose="020B0604020202020204" pitchFamily="34" charset="0"/>
+              </a:rPr>
+              <a:t>James Thomas </a:t>
+            </a:r>
+            <a:r>
+              <a:rPr lang="en-US" sz="800" b="0" i="0" dirty="0" smtClean="0">
+                <a:solidFill>
+                  <a:schemeClr val="tx1">
+                    <a:lumMod val="50000"/>
+                    <a:lumOff val="50000"/>
+                  </a:schemeClr>
+                </a:solidFill>
+                <a:effectLst/>
+                <a:latin typeface="Arial" panose="020B0604020202020204" pitchFamily="34" charset="0"/>
+                <a:cs typeface="Arial" panose="020B0604020202020204" pitchFamily="34" charset="0"/>
+              </a:rPr>
+              <a:t>and</a:t>
+            </a:r>
+            <a:r>
+              <a:rPr lang="en-US" sz="800" b="0" i="0" dirty="0" smtClean="0">
+                <a:solidFill>
+                  <a:schemeClr val="tx1">
+                    <a:lumMod val="85000"/>
+                    <a:lumOff val="15000"/>
+                  </a:schemeClr>
+                </a:solidFill>
+                <a:effectLst/>
+                <a:latin typeface="Arial" panose="020B0604020202020204" pitchFamily="34" charset="0"/>
+                <a:cs typeface="Arial" panose="020B0604020202020204" pitchFamily="34" charset="0"/>
+              </a:rPr>
+              <a:t> </a:t>
+            </a:r>
+            <a:r>
+              <a:rPr lang="en-US" sz="800" b="0" i="0" dirty="0" smtClean="0">
+                <a:solidFill>
+                  <a:srgbClr val="A6A6A6"/>
+                </a:solidFill>
+                <a:effectLst/>
+                <a:latin typeface="Arial" panose="020B0604020202020204" pitchFamily="34" charset="0"/>
+                <a:cs typeface="Arial" panose="020B0604020202020204" pitchFamily="34" charset="0"/>
+              </a:rPr>
+              <a:t> </a:t>
+            </a:r>
+            <a:r>
+              <a:rPr lang="en-US" sz="800" u="sng" dirty="0">
+                <a:solidFill>
+                  <a:srgbClr val="3D6CBC"/>
+                </a:solidFill>
+                <a:latin typeface="Arial" panose="020B0604020202020204" pitchFamily="34" charset="0"/>
+                <a:cs typeface="Arial" panose="020B0604020202020204" pitchFamily="34" charset="0"/>
+              </a:rPr>
+              <a:t>Ed </a:t>
+            </a:r>
+            <a:r>
+              <a:rPr lang="en-US" sz="800" u="sng" dirty="0" err="1">
+                <a:solidFill>
+                  <a:srgbClr val="3D6CBC"/>
+                </a:solidFill>
+                <a:latin typeface="Arial" panose="020B0604020202020204" pitchFamily="34" charset="0"/>
+                <a:cs typeface="Arial" panose="020B0604020202020204" pitchFamily="34" charset="0"/>
+              </a:rPr>
+              <a:t>Chatelain</a:t>
+            </a:r>
+            <a:endParaRPr lang="en-US" sz="800" u="sng" dirty="0">
+              <a:solidFill>
+                <a:srgbClr val="3D6CBC"/>
+              </a:solidFill>
+              <a:latin typeface="Arial" panose="020B0604020202020204" pitchFamily="34" charset="0"/>
+              <a:cs typeface="Arial" panose="020B0604020202020204" pitchFamily="34" charset="0"/>
+            </a:endParaRPr>
+          </a:p>
+          <a:p>
+            <a:pPr algn="ctr"/>
+            <a:r>
+              <a:rPr lang="en-US" sz="800" b="0" i="0" dirty="0" smtClean="0">
+                <a:solidFill>
+                  <a:schemeClr val="tx1">
+                    <a:lumMod val="50000"/>
+                    <a:lumOff val="50000"/>
+                  </a:schemeClr>
+                </a:solidFill>
+                <a:effectLst/>
+                <a:latin typeface="Arial" panose="020B0604020202020204" pitchFamily="34" charset="0"/>
+                <a:cs typeface="Arial" panose="020B0604020202020204" pitchFamily="34" charset="0"/>
+              </a:rPr>
+              <a:t>Part of</a:t>
+            </a:r>
+            <a:r>
+              <a:rPr lang="en-US" sz="800" b="0" i="0" dirty="0" smtClean="0">
+                <a:solidFill>
+                  <a:schemeClr val="tx1">
+                    <a:lumMod val="85000"/>
+                    <a:lumOff val="15000"/>
+                  </a:schemeClr>
+                </a:solidFill>
+                <a:effectLst/>
+                <a:latin typeface="Arial" panose="020B0604020202020204" pitchFamily="34" charset="0"/>
+                <a:cs typeface="Arial" panose="020B0604020202020204" pitchFamily="34" charset="0"/>
+              </a:rPr>
+              <a:t> </a:t>
+            </a:r>
+            <a:r>
+              <a:rPr lang="en-US" sz="800" u="sng" dirty="0" err="1">
+                <a:solidFill>
+                  <a:srgbClr val="3D6CBC"/>
+                </a:solidFill>
+                <a:latin typeface="Arial" panose="020B0604020202020204" pitchFamily="34" charset="0"/>
+                <a:cs typeface="Arial" panose="020B0604020202020204" pitchFamily="34" charset="0"/>
+              </a:rPr>
+              <a:t>TodoMVC</a:t>
+            </a:r>
+            <a:endParaRPr lang="en-US" sz="800" u="sng" dirty="0">
+              <a:solidFill>
+                <a:srgbClr val="3D6CBC"/>
+              </a:solidFill>
+              <a:latin typeface="Arial" panose="020B0604020202020204" pitchFamily="34" charset="0"/>
+              <a:cs typeface="Arial" panose="020B0604020202020204" pitchFamily="34" charset="0"/>
+            </a:endParaRPr>
+          </a:p>
+        </p:txBody>
+      </p:sp>
+      <p:sp>
+        <p:nvSpPr>
+          <p:cNvPr id="4" name="Rectangle 3"/>
+          <p:cNvSpPr/>
+          <p:nvPr/>
+        </p:nvSpPr>
+        <p:spPr>
+          <a:xfrm>
+            <a:off x="6160374" y="1197255"/>
+            <a:ext cx="1216807" cy="584775"/>
+          </a:xfrm>
+          <a:prstGeom prst="rect">
+            <a:avLst/>
+          </a:prstGeom>
+          <a:noFill/>
+        </p:spPr>
+        <p:txBody>
+          <a:bodyPr wrap="none" lIns="91440" tIns="45720" rIns="91440" bIns="45720">
+            <a:spAutoFit/>
+          </a:bodyPr>
+          <a:lstStyle/>
+          <a:p>
+            <a:pPr algn="ctr"/>
+            <a:r>
+              <a:rPr lang="en-US" sz="3200" b="1" dirty="0" err="1" smtClean="0">
+                <a:ln w="12700">
+                  <a:solidFill>
+                    <a:schemeClr val="tx2">
+                      <a:satMod val="155000"/>
+                    </a:schemeClr>
+                  </a:solidFill>
+                  <a:prstDash val="solid"/>
+                </a:ln>
+                <a:solidFill>
+                  <a:schemeClr val="bg2">
+                    <a:tint val="85000"/>
+                    <a:satMod val="155000"/>
+                  </a:schemeClr>
+                </a:solidFill>
+                <a:effectLst>
+                  <a:outerShdw blurRad="41275" dist="20320" dir="1800000" algn="tl" rotWithShape="0">
+                    <a:srgbClr val="000000">
+                      <a:alpha val="40000"/>
+                    </a:srgbClr>
+                  </a:outerShdw>
+                </a:effectLst>
+              </a:rPr>
+              <a:t>ToDos</a:t>
+            </a:r>
+            <a:endParaRPr lang="en-US" sz="3200" b="1" dirty="0">
+              <a:ln w="12700">
+                <a:solidFill>
+                  <a:schemeClr val="tx2">
+                    <a:satMod val="155000"/>
+                  </a:schemeClr>
+                </a:solidFill>
+                <a:prstDash val="solid"/>
+              </a:ln>
+              <a:solidFill>
+                <a:schemeClr val="bg2">
+                  <a:tint val="85000"/>
+                  <a:satMod val="155000"/>
+                </a:schemeClr>
+              </a:solidFill>
+              <a:effectLst>
+                <a:outerShdw blurRad="41275" dist="20320" dir="1800000" algn="tl" rotWithShape="0">
+                  <a:srgbClr val="000000">
+                    <a:alpha val="40000"/>
+                  </a:srgbClr>
+                </a:outerShdw>
+              </a:effectLst>
+            </a:endParaRPr>
+          </a:p>
+        </p:txBody>
+      </p:sp>
+      <p:sp>
+        <p:nvSpPr>
+          <p:cNvPr id="5" name="Rectangle 4"/>
+          <p:cNvSpPr/>
+          <p:nvPr/>
+        </p:nvSpPr>
+        <p:spPr>
+          <a:xfrm>
+            <a:off x="5524861" y="1870355"/>
+            <a:ext cx="2514600" cy="277177"/>
+          </a:xfrm>
+          <a:prstGeom prst="rect">
+            <a:avLst/>
+          </a:prstGeom>
+          <a:solidFill>
+            <a:srgbClr val="799FCD"/>
+          </a:solidFill>
+        </p:spPr>
+        <p:style>
+          <a:lnRef idx="2">
+            <a:schemeClr val="accent1">
+              <a:shade val="50000"/>
+            </a:schemeClr>
+          </a:lnRef>
+          <a:fillRef idx="1">
+            <a:schemeClr val="accent1"/>
+          </a:fillRef>
+          <a:effectRef idx="0">
+            <a:schemeClr val="accent1"/>
+          </a:effectRef>
+          <a:fontRef idx="minor">
+            <a:schemeClr val="lt1"/>
+          </a:fontRef>
+        </p:style>
+        <p:txBody>
+          <a:bodyPr rtlCol="0" anchor="ctr"/>
+          <a:lstStyle/>
+          <a:p>
+            <a:pPr algn="ctr"/>
+            <a:endParaRPr lang="en-US"/>
+          </a:p>
+        </p:txBody>
+      </p:sp>
+      <p:sp>
+        <p:nvSpPr>
+          <p:cNvPr id="51" name="Rectangle 50"/>
+          <p:cNvSpPr/>
+          <p:nvPr/>
+        </p:nvSpPr>
+        <p:spPr>
+          <a:xfrm>
+            <a:off x="5518063" y="1838241"/>
+            <a:ext cx="2521397" cy="316089"/>
+          </a:xfrm>
+          <a:prstGeom prst="rect">
+            <a:avLst/>
+          </a:prstGeom>
+          <a:solidFill>
+            <a:schemeClr val="bg1">
+              <a:lumMod val="75000"/>
+            </a:schemeClr>
+          </a:solidFill>
+          <a:ln>
+            <a:solidFill>
+              <a:schemeClr val="tx1">
+                <a:lumMod val="50000"/>
+                <a:lumOff val="50000"/>
+              </a:schemeClr>
+            </a:solidFill>
+            <a:prstDash val="sysDot"/>
+          </a:ln>
+        </p:spPr>
+        <p:style>
+          <a:lnRef idx="2">
+            <a:schemeClr val="accent1">
+              <a:shade val="50000"/>
+            </a:schemeClr>
+          </a:lnRef>
+          <a:fillRef idx="1">
+            <a:schemeClr val="accent1"/>
+          </a:fillRef>
+          <a:effectRef idx="0">
+            <a:schemeClr val="accent1"/>
+          </a:effectRef>
+          <a:fontRef idx="minor">
+            <a:schemeClr val="lt1"/>
+          </a:fontRef>
+        </p:style>
+        <p:txBody>
+          <a:bodyPr rtlCol="0" anchor="ctr"/>
+          <a:lstStyle/>
+          <a:p>
+            <a:pPr>
+              <a:tabLst>
+                <a:tab pos="341313" algn="l"/>
+              </a:tabLst>
+            </a:pPr>
+            <a:r>
+              <a:rPr lang="en-US" sz="1400" dirty="0">
+                <a:latin typeface="Helvetica Neue"/>
+              </a:rPr>
+              <a:t>   </a:t>
+            </a:r>
+            <a:r>
+              <a:rPr lang="en-US" sz="1400" dirty="0" smtClean="0">
+                <a:latin typeface="Helvetica Neue"/>
+              </a:rPr>
+              <a:t>  </a:t>
+            </a:r>
+            <a:r>
+              <a:rPr lang="en-US" sz="1400" i="1" dirty="0" smtClean="0">
+                <a:latin typeface="Arial" panose="020B0604020202020204" pitchFamily="34" charset="0"/>
+                <a:cs typeface="Arial" panose="020B0604020202020204" pitchFamily="34" charset="0"/>
+              </a:rPr>
+              <a:t>What </a:t>
+            </a:r>
+            <a:r>
+              <a:rPr lang="en-US" sz="1400" i="1" dirty="0">
+                <a:latin typeface="Arial" panose="020B0604020202020204" pitchFamily="34" charset="0"/>
+                <a:cs typeface="Arial" panose="020B0604020202020204" pitchFamily="34" charset="0"/>
+              </a:rPr>
+              <a:t>needs to be done?</a:t>
+            </a:r>
+          </a:p>
+        </p:txBody>
+      </p:sp>
+      <p:sp>
+        <p:nvSpPr>
+          <p:cNvPr id="53" name="Rectangle 52"/>
+          <p:cNvSpPr/>
+          <p:nvPr/>
+        </p:nvSpPr>
+        <p:spPr>
+          <a:xfrm>
+            <a:off x="5585464" y="1908385"/>
+            <a:ext cx="137573" cy="166535"/>
+          </a:xfrm>
+          <a:prstGeom prst="rect">
+            <a:avLst/>
+          </a:prstGeom>
+          <a:solidFill>
+            <a:schemeClr val="bg1">
+              <a:lumMod val="75000"/>
+            </a:schemeClr>
+          </a:solidFill>
+          <a:ln w="6350">
+            <a:solidFill>
+              <a:schemeClr val="bg1">
+                <a:lumMod val="85000"/>
+              </a:schemeClr>
+            </a:solidFill>
+          </a:ln>
+          <a:effectLst>
+            <a:innerShdw blurRad="63500" dist="50800" dir="16200000">
+              <a:prstClr val="black">
+                <a:alpha val="50000"/>
+              </a:prstClr>
+            </a:innerShdw>
+          </a:effectLst>
+        </p:spPr>
+        <p:style>
+          <a:lnRef idx="2">
+            <a:schemeClr val="accent1">
+              <a:shade val="50000"/>
+            </a:schemeClr>
+          </a:lnRef>
+          <a:fillRef idx="1">
+            <a:schemeClr val="accent1"/>
+          </a:fillRef>
+          <a:effectRef idx="0">
+            <a:schemeClr val="accent1"/>
+          </a:effectRef>
+          <a:fontRef idx="minor">
+            <a:schemeClr val="lt1"/>
+          </a:fontRef>
+        </p:style>
+        <p:txBody>
+          <a:bodyPr rtlCol="0" anchor="ctr"/>
+          <a:lstStyle/>
+          <a:p>
+            <a:pPr algn="ctr"/>
+            <a:endParaRPr lang="en-US">
+              <a:ln>
+                <a:solidFill>
+                  <a:schemeClr val="tx1">
+                    <a:lumMod val="85000"/>
+                    <a:lumOff val="15000"/>
+                  </a:schemeClr>
+                </a:solidFill>
+              </a:ln>
+            </a:endParaRPr>
+          </a:p>
+        </p:txBody>
+      </p:sp>
       <p:grpSp>
         <p:nvGrpSpPr>
-          <p:cNvPr id="11" name="Group 10"/>
+          <p:cNvPr id="7" name="Group 6"/>
           <p:cNvGrpSpPr/>
           <p:nvPr/>
         </p:nvGrpSpPr>
         <p:grpSpPr>
           <a:xfrm>
-            <a:off x="5251105" y="168555"/>
-            <a:ext cx="3035346" cy="6477000"/>
-            <a:chOff x="5251105" y="190500"/>
-            <a:chExt cx="3035346" cy="6477000"/>
+            <a:off x="5786844" y="1822651"/>
+            <a:ext cx="13378" cy="311926"/>
+            <a:chOff x="6155489" y="1844596"/>
+            <a:chExt cx="13378" cy="311926"/>
           </a:xfrm>
         </p:grpSpPr>
-        <p:pic>
-          <p:nvPicPr>
-            <p:cNvPr id="2" name="Picture 1"/>
-            <p:cNvPicPr>
-              <a:picLocks noChangeAspect="1"/>
-            </p:cNvPicPr>
+        <p:cxnSp>
+          <p:nvCxnSpPr>
+            <p:cNvPr id="61" name="Straight Connector 60"/>
+            <p:cNvCxnSpPr/>
             <p:nvPr/>
-          </p:nvPicPr>
-          <p:blipFill>
-            <a:blip r:embed="rId2">
-              <a:extLst>
-                <a:ext uri="{28A0092B-C50C-407E-A947-70E740481C1C}">
-                  <a14:useLocalDpi xmlns:a14="http://schemas.microsoft.com/office/drawing/2010/main" val="0"/>
-                </a:ext>
-              </a:extLst>
-            </a:blip>
-            <a:stretch>
-              <a:fillRect/>
-            </a:stretch>
-          </p:blipFill>
+          </p:nvCxnSpPr>
           <p:spPr>
             <a:xfrm>
-              <a:off x="5251105" y="190500"/>
-              <a:ext cx="3035346" cy="6477000"/>
+              <a:off x="6155489" y="1844596"/>
+              <a:ext cx="0" cy="311926"/>
             </a:xfrm>
-            <a:prstGeom prst="rect">
+            <a:prstGeom prst="line">
               <a:avLst/>
             </a:prstGeom>
-          </p:spPr>
-        </p:pic>
-        <p:sp>
-          <p:nvSpPr>
-            <p:cNvPr id="3" name="Rectangle 2"/>
-            <p:cNvSpPr/>
-            <p:nvPr/>
-          </p:nvSpPr>
-          <p:spPr>
-            <a:xfrm>
-              <a:off x="5479705" y="5105400"/>
-              <a:ext cx="2667000" cy="630942"/>
-            </a:xfrm>
-            <a:prstGeom prst="rect">
-              <a:avLst/>
-            </a:prstGeom>
-          </p:spPr>
-          <p:txBody>
-            <a:bodyPr wrap="square">
-              <a:spAutoFit/>
-            </a:bodyPr>
-            <a:lstStyle/>
-            <a:p>
-              <a:pPr algn="ctr"/>
-              <a:r>
-                <a:rPr lang="en-US" sz="1000" b="0" i="0" dirty="0" smtClean="0">
-                  <a:solidFill>
-                    <a:schemeClr val="tx1">
-                      <a:lumMod val="85000"/>
-                      <a:lumOff val="15000"/>
-                    </a:schemeClr>
-                  </a:solidFill>
-                  <a:effectLst/>
-                  <a:latin typeface="Arial" panose="020B0604020202020204" pitchFamily="34" charset="0"/>
-                  <a:cs typeface="Arial" panose="020B0604020202020204" pitchFamily="34" charset="0"/>
-                </a:rPr>
-                <a:t>Double-click a </a:t>
-              </a:r>
-              <a:r>
-                <a:rPr lang="en-US" sz="1000" b="0" i="0" dirty="0" err="1" smtClean="0">
-                  <a:solidFill>
-                    <a:schemeClr val="tx1">
-                      <a:lumMod val="85000"/>
-                      <a:lumOff val="15000"/>
-                    </a:schemeClr>
-                  </a:solidFill>
-                  <a:effectLst/>
-                  <a:latin typeface="Arial" panose="020B0604020202020204" pitchFamily="34" charset="0"/>
-                  <a:cs typeface="Arial" panose="020B0604020202020204" pitchFamily="34" charset="0"/>
-                </a:rPr>
-                <a:t>ToDo</a:t>
-              </a:r>
-              <a:r>
-                <a:rPr lang="en-US" sz="1000" b="0" i="0" dirty="0" smtClean="0">
-                  <a:solidFill>
-                    <a:schemeClr val="tx1">
-                      <a:lumMod val="85000"/>
-                      <a:lumOff val="15000"/>
-                    </a:schemeClr>
-                  </a:solidFill>
-                  <a:effectLst/>
-                  <a:latin typeface="Arial" panose="020B0604020202020204" pitchFamily="34" charset="0"/>
-                  <a:cs typeface="Arial" panose="020B0604020202020204" pitchFamily="34" charset="0"/>
-                </a:rPr>
-                <a:t> item to edit it</a:t>
-              </a:r>
-            </a:p>
-            <a:p>
-              <a:pPr algn="ctr"/>
-              <a:endParaRPr lang="en-US" sz="900" b="0" i="0" dirty="0" smtClean="0">
-                <a:solidFill>
-                  <a:schemeClr val="tx1">
-                    <a:lumMod val="85000"/>
-                    <a:lumOff val="15000"/>
-                  </a:schemeClr>
-                </a:solidFill>
-                <a:effectLst/>
-                <a:latin typeface="Arial" panose="020B0604020202020204" pitchFamily="34" charset="0"/>
-                <a:cs typeface="Arial" panose="020B0604020202020204" pitchFamily="34" charset="0"/>
-              </a:endParaRPr>
-            </a:p>
-            <a:p>
-              <a:pPr algn="ctr"/>
-              <a:r>
-                <a:rPr lang="en-US" sz="800" b="0" i="0" dirty="0" smtClean="0">
-                  <a:solidFill>
-                    <a:schemeClr val="tx1">
-                      <a:lumMod val="50000"/>
-                      <a:lumOff val="50000"/>
-                    </a:schemeClr>
-                  </a:solidFill>
-                  <a:effectLst/>
-                  <a:latin typeface="Arial" panose="020B0604020202020204" pitchFamily="34" charset="0"/>
-                  <a:cs typeface="Arial" panose="020B0604020202020204" pitchFamily="34" charset="0"/>
-                </a:rPr>
-                <a:t>Created by</a:t>
-              </a:r>
-              <a:r>
-                <a:rPr lang="en-US" sz="800" b="0" i="0" dirty="0" smtClean="0">
-                  <a:solidFill>
-                    <a:srgbClr val="A6A6A6"/>
-                  </a:solidFill>
-                  <a:effectLst/>
-                  <a:latin typeface="Arial" panose="020B0604020202020204" pitchFamily="34" charset="0"/>
-                  <a:cs typeface="Arial" panose="020B0604020202020204" pitchFamily="34" charset="0"/>
-                </a:rPr>
-                <a:t> </a:t>
-              </a:r>
-              <a:r>
-                <a:rPr lang="en-US" sz="800" b="0" i="0" u="sng" dirty="0" smtClean="0">
-                  <a:solidFill>
-                    <a:srgbClr val="3D6CBC"/>
-                  </a:solidFill>
-                  <a:effectLst/>
-                  <a:latin typeface="Arial" panose="020B0604020202020204" pitchFamily="34" charset="0"/>
-                  <a:cs typeface="Arial" panose="020B0604020202020204" pitchFamily="34" charset="0"/>
-                </a:rPr>
-                <a:t>James Thomas </a:t>
-              </a:r>
-              <a:r>
-                <a:rPr lang="en-US" sz="800" b="0" i="0" dirty="0" smtClean="0">
-                  <a:solidFill>
-                    <a:schemeClr val="tx1">
-                      <a:lumMod val="50000"/>
-                      <a:lumOff val="50000"/>
-                    </a:schemeClr>
-                  </a:solidFill>
-                  <a:effectLst/>
-                  <a:latin typeface="Arial" panose="020B0604020202020204" pitchFamily="34" charset="0"/>
-                  <a:cs typeface="Arial" panose="020B0604020202020204" pitchFamily="34" charset="0"/>
-                </a:rPr>
-                <a:t>and</a:t>
-              </a:r>
-              <a:r>
-                <a:rPr lang="en-US" sz="800" b="0" i="0" dirty="0" smtClean="0">
-                  <a:solidFill>
-                    <a:schemeClr val="tx1">
-                      <a:lumMod val="85000"/>
-                      <a:lumOff val="15000"/>
-                    </a:schemeClr>
-                  </a:solidFill>
-                  <a:effectLst/>
-                  <a:latin typeface="Arial" panose="020B0604020202020204" pitchFamily="34" charset="0"/>
-                  <a:cs typeface="Arial" panose="020B0604020202020204" pitchFamily="34" charset="0"/>
-                </a:rPr>
-                <a:t> </a:t>
-              </a:r>
-              <a:r>
-                <a:rPr lang="en-US" sz="800" b="0" i="0" dirty="0" smtClean="0">
-                  <a:solidFill>
-                    <a:srgbClr val="A6A6A6"/>
-                  </a:solidFill>
-                  <a:effectLst/>
-                  <a:latin typeface="Arial" panose="020B0604020202020204" pitchFamily="34" charset="0"/>
-                  <a:cs typeface="Arial" panose="020B0604020202020204" pitchFamily="34" charset="0"/>
-                </a:rPr>
-                <a:t> </a:t>
-              </a:r>
-              <a:r>
-                <a:rPr lang="en-US" sz="800" u="sng" dirty="0">
-                  <a:solidFill>
-                    <a:srgbClr val="3D6CBC"/>
-                  </a:solidFill>
-                  <a:latin typeface="Arial" panose="020B0604020202020204" pitchFamily="34" charset="0"/>
-                  <a:cs typeface="Arial" panose="020B0604020202020204" pitchFamily="34" charset="0"/>
-                </a:rPr>
-                <a:t>Ed </a:t>
-              </a:r>
-              <a:r>
-                <a:rPr lang="en-US" sz="800" u="sng" dirty="0" err="1">
-                  <a:solidFill>
-                    <a:srgbClr val="3D6CBC"/>
-                  </a:solidFill>
-                  <a:latin typeface="Arial" panose="020B0604020202020204" pitchFamily="34" charset="0"/>
-                  <a:cs typeface="Arial" panose="020B0604020202020204" pitchFamily="34" charset="0"/>
-                </a:rPr>
-                <a:t>Chatelain</a:t>
-              </a:r>
-              <a:endParaRPr lang="en-US" sz="800" u="sng" dirty="0">
-                <a:solidFill>
-                  <a:srgbClr val="3D6CBC"/>
-                </a:solidFill>
-                <a:latin typeface="Arial" panose="020B0604020202020204" pitchFamily="34" charset="0"/>
-                <a:cs typeface="Arial" panose="020B0604020202020204" pitchFamily="34" charset="0"/>
-              </a:endParaRPr>
-            </a:p>
-            <a:p>
-              <a:pPr algn="ctr"/>
-              <a:r>
-                <a:rPr lang="en-US" sz="800" b="0" i="0" dirty="0" smtClean="0">
-                  <a:solidFill>
-                    <a:schemeClr val="tx1">
-                      <a:lumMod val="50000"/>
-                      <a:lumOff val="50000"/>
-                    </a:schemeClr>
-                  </a:solidFill>
-                  <a:effectLst/>
-                  <a:latin typeface="Arial" panose="020B0604020202020204" pitchFamily="34" charset="0"/>
-                  <a:cs typeface="Arial" panose="020B0604020202020204" pitchFamily="34" charset="0"/>
-                </a:rPr>
-                <a:t>Part of</a:t>
-              </a:r>
-              <a:r>
-                <a:rPr lang="en-US" sz="800" b="0" i="0" dirty="0" smtClean="0">
-                  <a:solidFill>
-                    <a:schemeClr val="tx1">
-                      <a:lumMod val="85000"/>
-                      <a:lumOff val="15000"/>
-                    </a:schemeClr>
-                  </a:solidFill>
-                  <a:effectLst/>
-                  <a:latin typeface="Arial" panose="020B0604020202020204" pitchFamily="34" charset="0"/>
-                  <a:cs typeface="Arial" panose="020B0604020202020204" pitchFamily="34" charset="0"/>
-                </a:rPr>
-                <a:t> </a:t>
-              </a:r>
-              <a:r>
-                <a:rPr lang="en-US" sz="800" u="sng" dirty="0" err="1">
-                  <a:solidFill>
-                    <a:srgbClr val="3D6CBC"/>
-                  </a:solidFill>
-                  <a:latin typeface="Arial" panose="020B0604020202020204" pitchFamily="34" charset="0"/>
-                  <a:cs typeface="Arial" panose="020B0604020202020204" pitchFamily="34" charset="0"/>
-                </a:rPr>
-                <a:t>TodoMVC</a:t>
-              </a:r>
-              <a:endParaRPr lang="en-US" sz="800" u="sng" dirty="0">
-                <a:solidFill>
-                  <a:srgbClr val="3D6CBC"/>
-                </a:solidFill>
-                <a:latin typeface="Arial" panose="020B0604020202020204" pitchFamily="34" charset="0"/>
-                <a:cs typeface="Arial" panose="020B0604020202020204" pitchFamily="34" charset="0"/>
-              </a:endParaRPr>
-            </a:p>
-          </p:txBody>
-        </p:sp>
-        <p:sp>
-          <p:nvSpPr>
-            <p:cNvPr id="4" name="Rectangle 3"/>
-            <p:cNvSpPr/>
-            <p:nvPr/>
-          </p:nvSpPr>
-          <p:spPr>
-            <a:xfrm>
-              <a:off x="6160374" y="1219200"/>
-              <a:ext cx="1216807" cy="584775"/>
-            </a:xfrm>
-            <a:prstGeom prst="rect">
-              <a:avLst/>
-            </a:prstGeom>
-            <a:noFill/>
-          </p:spPr>
-          <p:txBody>
-            <a:bodyPr wrap="none" lIns="91440" tIns="45720" rIns="91440" bIns="45720">
-              <a:spAutoFit/>
-            </a:bodyPr>
-            <a:lstStyle/>
-            <a:p>
-              <a:pPr algn="ctr"/>
-              <a:r>
-                <a:rPr lang="en-US" sz="3200" b="1" cap="none" spc="0" dirty="0" err="1" smtClean="0">
-                  <a:ln w="17780" cmpd="sng">
-                    <a:solidFill>
-                      <a:srgbClr val="FFFFFF"/>
-                    </a:solidFill>
-                    <a:prstDash val="solid"/>
-                    <a:miter lim="800000"/>
-                  </a:ln>
-                  <a:gradFill rotWithShape="1">
-                    <a:gsLst>
-                      <a:gs pos="0">
-                        <a:srgbClr val="000000">
-                          <a:tint val="92000"/>
-                          <a:shade val="100000"/>
-                          <a:satMod val="150000"/>
-                        </a:srgbClr>
-                      </a:gs>
-                      <a:gs pos="49000">
-                        <a:srgbClr val="000000">
-                          <a:tint val="89000"/>
-                          <a:shade val="90000"/>
-                          <a:satMod val="150000"/>
-                        </a:srgbClr>
-                      </a:gs>
-                      <a:gs pos="50000">
-                        <a:srgbClr val="000000">
-                          <a:tint val="100000"/>
-                          <a:shade val="75000"/>
-                          <a:satMod val="150000"/>
-                        </a:srgbClr>
-                      </a:gs>
-                      <a:gs pos="95000">
-                        <a:srgbClr val="000000">
-                          <a:shade val="47000"/>
-                          <a:satMod val="150000"/>
-                        </a:srgbClr>
-                      </a:gs>
-                      <a:gs pos="100000">
-                        <a:srgbClr val="000000">
-                          <a:shade val="39000"/>
-                          <a:satMod val="150000"/>
-                        </a:srgbClr>
-                      </a:gs>
-                    </a:gsLst>
-                    <a:lin ang="5400000"/>
-                  </a:gradFill>
-                  <a:effectLst>
-                    <a:outerShdw blurRad="50800" algn="tl" rotWithShape="0">
-                      <a:srgbClr val="000000"/>
-                    </a:outerShdw>
-                  </a:effectLst>
-                </a:rPr>
-                <a:t>ToDos</a:t>
-              </a:r>
-              <a:endParaRPr lang="en-US" sz="3200" b="1" cap="none" spc="0" dirty="0">
-                <a:ln w="17780" cmpd="sng">
-                  <a:solidFill>
-                    <a:srgbClr val="FFFFFF"/>
-                  </a:solidFill>
-                  <a:prstDash val="solid"/>
-                  <a:miter lim="800000"/>
-                </a:ln>
-                <a:gradFill rotWithShape="1">
-                  <a:gsLst>
-                    <a:gs pos="0">
-                      <a:srgbClr val="000000">
-                        <a:tint val="92000"/>
-                        <a:shade val="100000"/>
-                        <a:satMod val="150000"/>
-                      </a:srgbClr>
-                    </a:gs>
-                    <a:gs pos="49000">
-                      <a:srgbClr val="000000">
-                        <a:tint val="89000"/>
-                        <a:shade val="90000"/>
-                        <a:satMod val="150000"/>
-                      </a:srgbClr>
-                    </a:gs>
-                    <a:gs pos="50000">
-                      <a:srgbClr val="000000">
-                        <a:tint val="100000"/>
-                        <a:shade val="75000"/>
-                        <a:satMod val="150000"/>
-                      </a:srgbClr>
-                    </a:gs>
-                    <a:gs pos="95000">
-                      <a:srgbClr val="000000">
-                        <a:shade val="47000"/>
-                        <a:satMod val="150000"/>
-                      </a:srgbClr>
-                    </a:gs>
-                    <a:gs pos="100000">
-                      <a:srgbClr val="000000">
-                        <a:shade val="39000"/>
-                        <a:satMod val="150000"/>
-                      </a:srgbClr>
-                    </a:gs>
-                  </a:gsLst>
-                  <a:lin ang="5400000"/>
-                </a:gradFill>
-                <a:effectLst>
-                  <a:outerShdw blurRad="50800" algn="tl" rotWithShape="0">
-                    <a:srgbClr val="000000"/>
-                  </a:outerShdw>
-                </a:effectLst>
-              </a:endParaRPr>
-            </a:p>
-          </p:txBody>
-        </p:sp>
-        <p:sp>
-          <p:nvSpPr>
-            <p:cNvPr id="5" name="Rectangle 4"/>
-            <p:cNvSpPr/>
-            <p:nvPr/>
-          </p:nvSpPr>
-          <p:spPr>
-            <a:xfrm>
-              <a:off x="5524861" y="1892300"/>
-              <a:ext cx="2514600" cy="277177"/>
-            </a:xfrm>
-            <a:prstGeom prst="rect">
-              <a:avLst/>
-            </a:prstGeom>
-            <a:solidFill>
-              <a:srgbClr val="799FCD"/>
-            </a:solidFill>
+            <a:ln w="3175">
+              <a:solidFill>
+                <a:schemeClr val="accent2">
+                  <a:lumMod val="75000"/>
+                </a:schemeClr>
+              </a:solidFill>
+            </a:ln>
           </p:spPr>
           <p:style>
-            <a:lnRef idx="2">
-              <a:schemeClr val="accent1">
-                <a:shade val="50000"/>
-              </a:schemeClr>
+            <a:lnRef idx="1">
+              <a:schemeClr val="accent1"/>
             </a:lnRef>
-            <a:fillRef idx="1">
+            <a:fillRef idx="0">
               <a:schemeClr val="accent1"/>
             </a:fillRef>
             <a:effectRef idx="0">
               <a:schemeClr val="accent1"/>
             </a:effectRef>
             <a:fontRef idx="minor">
-              <a:schemeClr val="lt1"/>
+              <a:schemeClr val="tx1"/>
             </a:fontRef>
           </p:style>
-          <p:txBody>
-            <a:bodyPr rtlCol="0" anchor="ctr"/>
-            <a:lstStyle/>
-            <a:p>
-              <a:pPr algn="ctr"/>
-              <a:endParaRPr lang="en-US"/>
-            </a:p>
-          </p:txBody>
-        </p:sp>
-        <p:sp>
-          <p:nvSpPr>
-            <p:cNvPr id="51" name="Rectangle 50"/>
-            <p:cNvSpPr/>
+        </p:cxnSp>
+        <p:cxnSp>
+          <p:nvCxnSpPr>
+            <p:cNvPr id="62" name="Straight Connector 61"/>
+            <p:cNvCxnSpPr/>
             <p:nvPr/>
-          </p:nvSpPr>
+          </p:nvCxnSpPr>
           <p:spPr>
             <a:xfrm>
-              <a:off x="5518063" y="1860186"/>
-              <a:ext cx="2521397" cy="316089"/>
+              <a:off x="6168867" y="1844596"/>
+              <a:ext cx="0" cy="311926"/>
             </a:xfrm>
-            <a:prstGeom prst="rect">
+            <a:prstGeom prst="line">
               <a:avLst/>
             </a:prstGeom>
-            <a:solidFill>
-              <a:schemeClr val="bg1">
-                <a:lumMod val="75000"/>
-              </a:schemeClr>
-            </a:solidFill>
-            <a:ln>
+            <a:ln w="3175">
               <a:solidFill>
-                <a:schemeClr val="tx1">
-                  <a:lumMod val="50000"/>
-                  <a:lumOff val="50000"/>
+                <a:schemeClr val="accent2">
+                  <a:lumMod val="75000"/>
                 </a:schemeClr>
               </a:solidFill>
-              <a:prstDash val="sysDot"/>
             </a:ln>
           </p:spPr>
           <p:style>
-            <a:lnRef idx="2">
-              <a:schemeClr val="accent1">
-                <a:shade val="50000"/>
-              </a:schemeClr>
+            <a:lnRef idx="1">
+              <a:schemeClr val="accent1"/>
             </a:lnRef>
-            <a:fillRef idx="1">
+            <a:fillRef idx="0">
               <a:schemeClr val="accent1"/>
             </a:fillRef>
             <a:effectRef idx="0">
               <a:schemeClr val="accent1"/>
             </a:effectRef>
             <a:fontRef idx="minor">
-              <a:schemeClr val="lt1"/>
+              <a:schemeClr val="tx1"/>
             </a:fontRef>
           </p:style>
-          <p:txBody>
-            <a:bodyPr rtlCol="0" anchor="ctr"/>
-            <a:lstStyle/>
-            <a:p>
-              <a:pPr>
-                <a:tabLst>
-                  <a:tab pos="341313" algn="l"/>
-                </a:tabLst>
-              </a:pPr>
-              <a:r>
-                <a:rPr lang="en-US" sz="1400" dirty="0">
-                  <a:latin typeface="Helvetica Neue"/>
-                </a:rPr>
-                <a:t>   </a:t>
-              </a:r>
-              <a:r>
-                <a:rPr lang="en-US" sz="1400" dirty="0" smtClean="0">
-                  <a:latin typeface="Helvetica Neue"/>
-                </a:rPr>
-                <a:t>  </a:t>
-              </a:r>
-              <a:r>
-                <a:rPr lang="en-US" sz="1400" i="1" dirty="0" smtClean="0">
-                  <a:latin typeface="Arial" panose="020B0604020202020204" pitchFamily="34" charset="0"/>
-                  <a:cs typeface="Arial" panose="020B0604020202020204" pitchFamily="34" charset="0"/>
-                </a:rPr>
-                <a:t>What </a:t>
-              </a:r>
-              <a:r>
-                <a:rPr lang="en-US" sz="1400" i="1" dirty="0">
-                  <a:latin typeface="Arial" panose="020B0604020202020204" pitchFamily="34" charset="0"/>
-                  <a:cs typeface="Arial" panose="020B0604020202020204" pitchFamily="34" charset="0"/>
-                </a:rPr>
-                <a:t>needs to be done?</a:t>
-              </a:r>
-            </a:p>
-          </p:txBody>
-        </p:sp>
-        <p:sp>
-          <p:nvSpPr>
-            <p:cNvPr id="53" name="Rectangle 52"/>
-            <p:cNvSpPr/>
-            <p:nvPr/>
-          </p:nvSpPr>
-          <p:spPr>
-            <a:xfrm>
-              <a:off x="5585464" y="1930330"/>
-              <a:ext cx="137573" cy="166535"/>
-            </a:xfrm>
-            <a:prstGeom prst="rect">
-              <a:avLst/>
-            </a:prstGeom>
+        </p:cxnSp>
+      </p:grpSp>
+      <p:sp>
+        <p:nvSpPr>
+          <p:cNvPr id="9" name="Dodecagon 8"/>
+          <p:cNvSpPr/>
+          <p:nvPr/>
+        </p:nvSpPr>
+        <p:spPr>
+          <a:xfrm>
+            <a:off x="7818774" y="1877047"/>
+            <a:ext cx="197510" cy="214579"/>
+          </a:xfrm>
+          <a:prstGeom prst="dodecagon">
+            <a:avLst/>
+          </a:prstGeom>
+          <a:solidFill>
+            <a:srgbClr val="B4B4B4"/>
+          </a:solidFill>
+          <a:ln w="15875">
             <a:solidFill>
-              <a:schemeClr val="bg1">
-                <a:lumMod val="75000"/>
-              </a:schemeClr>
+              <a:schemeClr val="bg1"/>
             </a:solidFill>
-            <a:ln w="6350">
-              <a:solidFill>
-                <a:schemeClr val="bg1">
-                  <a:lumMod val="85000"/>
-                </a:schemeClr>
-              </a:solidFill>
-            </a:ln>
-            <a:effectLst>
-              <a:innerShdw blurRad="63500" dist="50800" dir="16200000">
-                <a:prstClr val="black">
-                  <a:alpha val="50000"/>
-                </a:prstClr>
-              </a:innerShdw>
-            </a:effectLst>
-          </p:spPr>
-          <p:style>
-            <a:lnRef idx="2">
-              <a:schemeClr val="accent1">
-                <a:shade val="50000"/>
-              </a:schemeClr>
-            </a:lnRef>
-            <a:fillRef idx="1">
-              <a:schemeClr val="accent1"/>
-            </a:fillRef>
-            <a:effectRef idx="0">
-              <a:schemeClr val="accent1"/>
-            </a:effectRef>
-            <a:fontRef idx="minor">
-              <a:schemeClr val="lt1"/>
-            </a:fontRef>
-          </p:style>
-          <p:txBody>
-            <a:bodyPr rtlCol="0" anchor="ctr"/>
-            <a:lstStyle/>
-            <a:p>
-              <a:pPr algn="ctr"/>
-              <a:endParaRPr lang="en-US">
-                <a:ln>
-                  <a:solidFill>
-                    <a:schemeClr val="tx1">
-                      <a:lumMod val="85000"/>
-                      <a:lumOff val="15000"/>
-                    </a:schemeClr>
-                  </a:solidFill>
-                </a:ln>
-              </a:endParaRPr>
-            </a:p>
-          </p:txBody>
-        </p:sp>
-        <p:grpSp>
-          <p:nvGrpSpPr>
-            <p:cNvPr id="7" name="Group 6"/>
-            <p:cNvGrpSpPr/>
-            <p:nvPr/>
-          </p:nvGrpSpPr>
-          <p:grpSpPr>
-            <a:xfrm>
-              <a:off x="5786844" y="1844596"/>
-              <a:ext cx="13378" cy="311926"/>
-              <a:chOff x="6155489" y="1844596"/>
-              <a:chExt cx="13378" cy="311926"/>
-            </a:xfrm>
-          </p:grpSpPr>
-          <p:cxnSp>
-            <p:nvCxnSpPr>
-              <p:cNvPr id="61" name="Straight Connector 60"/>
-              <p:cNvCxnSpPr/>
-              <p:nvPr/>
-            </p:nvCxnSpPr>
-            <p:spPr>
-              <a:xfrm>
-                <a:off x="6155489" y="1844596"/>
-                <a:ext cx="0" cy="311926"/>
-              </a:xfrm>
-              <a:prstGeom prst="line">
-                <a:avLst/>
-              </a:prstGeom>
-              <a:ln w="3175">
-                <a:solidFill>
-                  <a:schemeClr val="accent2">
-                    <a:lumMod val="75000"/>
-                  </a:schemeClr>
-                </a:solidFill>
-              </a:ln>
-            </p:spPr>
-            <p:style>
-              <a:lnRef idx="1">
-                <a:schemeClr val="accent1"/>
-              </a:lnRef>
-              <a:fillRef idx="0">
-                <a:schemeClr val="accent1"/>
-              </a:fillRef>
-              <a:effectRef idx="0">
-                <a:schemeClr val="accent1"/>
-              </a:effectRef>
-              <a:fontRef idx="minor">
-                <a:schemeClr val="tx1"/>
-              </a:fontRef>
-            </p:style>
-          </p:cxnSp>
-          <p:cxnSp>
-            <p:nvCxnSpPr>
-              <p:cNvPr id="62" name="Straight Connector 61"/>
-              <p:cNvCxnSpPr/>
-              <p:nvPr/>
-            </p:nvCxnSpPr>
-            <p:spPr>
-              <a:xfrm>
-                <a:off x="6168867" y="1844596"/>
-                <a:ext cx="0" cy="311926"/>
-              </a:xfrm>
-              <a:prstGeom prst="line">
-                <a:avLst/>
-              </a:prstGeom>
-              <a:ln w="3175">
-                <a:solidFill>
-                  <a:schemeClr val="accent2">
-                    <a:lumMod val="75000"/>
-                  </a:schemeClr>
-                </a:solidFill>
-              </a:ln>
-            </p:spPr>
-            <p:style>
-              <a:lnRef idx="1">
-                <a:schemeClr val="accent1"/>
-              </a:lnRef>
-              <a:fillRef idx="0">
-                <a:schemeClr val="accent1"/>
-              </a:fillRef>
-              <a:effectRef idx="0">
-                <a:schemeClr val="accent1"/>
-              </a:effectRef>
-              <a:fontRef idx="minor">
-                <a:schemeClr val="tx1"/>
-              </a:fontRef>
-            </p:style>
-          </p:cxnSp>
-        </p:grpSp>
-        <p:sp>
-          <p:nvSpPr>
-            <p:cNvPr id="9" name="Dodecagon 8"/>
-            <p:cNvSpPr/>
-            <p:nvPr/>
-          </p:nvSpPr>
-          <p:spPr>
-            <a:xfrm>
-              <a:off x="7818774" y="1898992"/>
-              <a:ext cx="197510" cy="214579"/>
-            </a:xfrm>
-            <a:prstGeom prst="dodecagon">
-              <a:avLst/>
-            </a:prstGeom>
-            <a:solidFill>
-              <a:srgbClr val="B4B4B4"/>
-            </a:solidFill>
-            <a:ln w="15875">
+          </a:ln>
+        </p:spPr>
+        <p:style>
+          <a:lnRef idx="2">
+            <a:schemeClr val="accent1">
+              <a:shade val="50000"/>
+            </a:schemeClr>
+          </a:lnRef>
+          <a:fillRef idx="1">
+            <a:schemeClr val="accent1"/>
+          </a:fillRef>
+          <a:effectRef idx="0">
+            <a:schemeClr val="accent1"/>
+          </a:effectRef>
+          <a:fontRef idx="minor">
+            <a:schemeClr val="lt1"/>
+          </a:fontRef>
+        </p:style>
+        <p:txBody>
+          <a:bodyPr rtlCol="0" anchor="ctr"/>
+          <a:lstStyle/>
+          <a:p>
+            <a:pPr algn="ctr"/>
+            <a:r>
+              <a:rPr lang="en-US" dirty="0" smtClean="0">
+                <a:solidFill>
+                  <a:schemeClr val="bg1"/>
+                </a:solidFill>
+              </a:rPr>
+              <a:t>1</a:t>
+            </a:r>
+            <a:endParaRPr lang="en-US" dirty="0">
               <a:solidFill>
                 <a:schemeClr val="bg1"/>
               </a:solidFill>
-            </a:ln>
-          </p:spPr>
-          <p:style>
-            <a:lnRef idx="2">
-              <a:schemeClr val="accent1">
-                <a:shade val="50000"/>
-              </a:schemeClr>
-            </a:lnRef>
-            <a:fillRef idx="1">
-              <a:schemeClr val="accent1"/>
-            </a:fillRef>
-            <a:effectRef idx="0">
-              <a:schemeClr val="accent1"/>
-            </a:effectRef>
-            <a:fontRef idx="minor">
-              <a:schemeClr val="lt1"/>
-            </a:fontRef>
-          </p:style>
-          <p:txBody>
-            <a:bodyPr rtlCol="0" anchor="ctr"/>
-            <a:lstStyle/>
-            <a:p>
-              <a:pPr algn="ctr"/>
-              <a:r>
-                <a:rPr lang="en-US" dirty="0" smtClean="0">
-                  <a:solidFill>
-                    <a:schemeClr val="bg1"/>
-                  </a:solidFill>
-                </a:rPr>
-                <a:t>1</a:t>
-              </a:r>
-              <a:endParaRPr lang="en-US" dirty="0">
-                <a:solidFill>
-                  <a:schemeClr val="bg1"/>
-                </a:solidFill>
-              </a:endParaRPr>
-            </a:p>
-          </p:txBody>
-        </p:sp>
-      </p:grpSp>
+            </a:endParaRPr>
+          </a:p>
+        </p:txBody>
+      </p:sp>
       <p:sp>
         <p:nvSpPr>
           <p:cNvPr id="10" name="TextBox 9"/>
@@ -9551,23 +9478,119 @@
           <a:chExt cx="0" cy="0"/>
         </a:xfrm>
       </p:grpSpPr>
+      <p:sp>
+        <p:nvSpPr>
+          <p:cNvPr id="10" name="TextBox 9"/>
+          <p:cNvSpPr txBox="1"/>
+          <p:nvPr/>
+        </p:nvSpPr>
+        <p:spPr>
+          <a:xfrm>
+            <a:off x="512064" y="709574"/>
+            <a:ext cx="4059936" cy="461665"/>
+          </a:xfrm>
+          <a:prstGeom prst="rect">
+            <a:avLst/>
+          </a:prstGeom>
+          <a:noFill/>
+        </p:spPr>
+        <p:txBody>
+          <a:bodyPr wrap="square" rtlCol="0">
+            <a:spAutoFit/>
+          </a:bodyPr>
+          <a:lstStyle/>
+          <a:p>
+            <a:r>
+              <a:rPr lang="en-US" sz="1200" dirty="0" smtClean="0">
+                <a:latin typeface="Times New Roman" panose="02020603050405020304" pitchFamily="18" charset="0"/>
+                <a:cs typeface="Times New Roman" panose="02020603050405020304" pitchFamily="18" charset="0"/>
+              </a:rPr>
+              <a:t>Tasks are typed into the input line. Multi-line tasks are accepted.</a:t>
+            </a:r>
+            <a:endParaRPr lang="en-US" sz="1200" dirty="0">
+              <a:latin typeface="Times New Roman" panose="02020603050405020304" pitchFamily="18" charset="0"/>
+              <a:cs typeface="Times New Roman" panose="02020603050405020304" pitchFamily="18" charset="0"/>
+            </a:endParaRPr>
+          </a:p>
+        </p:txBody>
+      </p:sp>
+      <p:sp>
+        <p:nvSpPr>
+          <p:cNvPr id="19" name="Dodecagon 18"/>
+          <p:cNvSpPr/>
+          <p:nvPr/>
+        </p:nvSpPr>
+        <p:spPr>
+          <a:xfrm>
+            <a:off x="187746" y="740783"/>
+            <a:ext cx="197510" cy="214579"/>
+          </a:xfrm>
+          <a:prstGeom prst="dodecagon">
+            <a:avLst/>
+          </a:prstGeom>
+          <a:solidFill>
+            <a:srgbClr val="B4B4B4"/>
+          </a:solidFill>
+          <a:ln>
+            <a:solidFill>
+              <a:schemeClr val="bg1"/>
+            </a:solidFill>
+          </a:ln>
+        </p:spPr>
+        <p:style>
+          <a:lnRef idx="2">
+            <a:schemeClr val="accent1">
+              <a:shade val="50000"/>
+            </a:schemeClr>
+          </a:lnRef>
+          <a:fillRef idx="1">
+            <a:schemeClr val="accent1"/>
+          </a:fillRef>
+          <a:effectRef idx="0">
+            <a:schemeClr val="accent1"/>
+          </a:effectRef>
+          <a:fontRef idx="minor">
+            <a:schemeClr val="lt1"/>
+          </a:fontRef>
+        </p:style>
+        <p:txBody>
+          <a:bodyPr rtlCol="0" anchor="ctr"/>
+          <a:lstStyle/>
+          <a:p>
+            <a:pPr algn="ctr"/>
+            <a:r>
+              <a:rPr lang="en-US" dirty="0" smtClean="0">
+                <a:solidFill>
+                  <a:schemeClr val="bg1"/>
+                </a:solidFill>
+              </a:rPr>
+              <a:t>1</a:t>
+            </a:r>
+            <a:endParaRPr lang="en-US" dirty="0">
+              <a:solidFill>
+                <a:schemeClr val="bg1"/>
+              </a:solidFill>
+            </a:endParaRPr>
+          </a:p>
+        </p:txBody>
+      </p:sp>
       <p:grpSp>
         <p:nvGrpSpPr>
-          <p:cNvPr id="11" name="Group 10"/>
+          <p:cNvPr id="13" name="Group 12"/>
           <p:cNvGrpSpPr/>
           <p:nvPr/>
         </p:nvGrpSpPr>
         <p:grpSpPr>
           <a:xfrm>
-            <a:off x="5251105" y="153925"/>
-            <a:ext cx="3035346" cy="6477000"/>
-            <a:chOff x="5251105" y="190500"/>
-            <a:chExt cx="3035346" cy="6477000"/>
+            <a:off x="5064848" y="156167"/>
+            <a:ext cx="3080214" cy="6569519"/>
+            <a:chOff x="1491786" y="0"/>
+            <a:chExt cx="3080214" cy="6569519"/>
           </a:xfrm>
         </p:grpSpPr>
         <p:pic>
           <p:nvPicPr>
-            <p:cNvPr id="2" name="Picture 1"/>
+            <p:cNvPr id="8" name="Picture 7"/>
             <p:cNvPicPr>
               <a:picLocks noChangeAspect="1"/>
             </p:cNvPicPr>
@@ -9587,8 +9610,8 @@
           </p:blipFill>
           <p:spPr>
             <a:xfrm>
-              <a:off x="5251105" y="190500"/>
-              <a:ext cx="3035346" cy="6477000"/>
+              <a:off x="1491786" y="0"/>
+              <a:ext cx="3080214" cy="6569519"/>
             </a:xfrm>
             <a:prstGeom prst="rect">
               <a:avLst/>
@@ -9597,13 +9620,13 @@
         </p:pic>
         <p:sp>
           <p:nvSpPr>
-            <p:cNvPr id="3" name="Rectangle 2"/>
+            <p:cNvPr id="17" name="Rectangle 16"/>
             <p:cNvSpPr/>
             <p:nvPr/>
           </p:nvSpPr>
           <p:spPr>
             <a:xfrm>
-              <a:off x="5479705" y="5105400"/>
+              <a:off x="1732836" y="4907739"/>
               <a:ext cx="2667000" cy="630942"/>
             </a:xfrm>
             <a:prstGeom prst="rect">
@@ -9831,146 +9854,13 @@
         </p:sp>
         <p:sp>
           <p:nvSpPr>
-            <p:cNvPr id="4" name="Rectangle 3"/>
+            <p:cNvPr id="18" name="Rectangle 17"/>
             <p:cNvSpPr/>
             <p:nvPr/>
           </p:nvSpPr>
           <p:spPr>
             <a:xfrm>
-              <a:off x="6160374" y="1219200"/>
-              <a:ext cx="1216807" cy="584775"/>
-            </a:xfrm>
-            <a:prstGeom prst="rect">
-              <a:avLst/>
-            </a:prstGeom>
-            <a:noFill/>
-          </p:spPr>
-          <p:txBody>
-            <a:bodyPr wrap="none" lIns="91440" tIns="45720" rIns="91440" bIns="45720">
-              <a:spAutoFit/>
-            </a:bodyPr>
-            <a:lstStyle/>
-            <a:p>
-              <a:pPr algn="ctr"/>
-              <a:r>
-                <a:rPr lang="en-US" sz="3200" b="1" cap="none" spc="0" dirty="0" err="1" smtClean="0">
-                  <a:ln w="17780" cmpd="sng">
-                    <a:solidFill>
-                      <a:srgbClr val="FFFFFF"/>
-                    </a:solidFill>
-                    <a:prstDash val="solid"/>
-                    <a:miter lim="800000"/>
-                  </a:ln>
-                  <a:gradFill rotWithShape="1">
-                    <a:gsLst>
-                      <a:gs pos="0">
-                        <a:srgbClr val="000000">
-                          <a:tint val="92000"/>
-                          <a:shade val="100000"/>
-                          <a:satMod val="150000"/>
-                        </a:srgbClr>
-                      </a:gs>
-                      <a:gs pos="49000">
-                        <a:srgbClr val="000000">
-                          <a:tint val="89000"/>
-                          <a:shade val="90000"/>
-                          <a:satMod val="150000"/>
-                        </a:srgbClr>
-                      </a:gs>
-                      <a:gs pos="50000">
-                        <a:srgbClr val="000000">
-                          <a:tint val="100000"/>
-                          <a:shade val="75000"/>
-                          <a:satMod val="150000"/>
-                        </a:srgbClr>
-                      </a:gs>
-                      <a:gs pos="95000">
-                        <a:srgbClr val="000000">
-                          <a:shade val="47000"/>
-                          <a:satMod val="150000"/>
-                        </a:srgbClr>
-                      </a:gs>
-                      <a:gs pos="100000">
-                        <a:srgbClr val="000000">
-                          <a:shade val="39000"/>
-                          <a:satMod val="150000"/>
-                        </a:srgbClr>
-                      </a:gs>
-                    </a:gsLst>
-                    <a:lin ang="5400000"/>
-                  </a:gradFill>
-                  <a:effectLst>
-                    <a:outerShdw blurRad="50800" algn="tl" rotWithShape="0">
-                      <a:srgbClr val="000000"/>
-                    </a:outerShdw>
-                  </a:effectLst>
-                </a:rPr>
-                <a:t>ToDos</a:t>
-              </a:r>
-              <a:endParaRPr lang="en-US" sz="3200" b="1" cap="none" spc="0" dirty="0">
-                <a:ln w="17780" cmpd="sng">
-                  <a:solidFill>
-                    <a:srgbClr val="FFFFFF"/>
-                  </a:solidFill>
-                  <a:prstDash val="solid"/>
-                  <a:miter lim="800000"/>
-                </a:ln>
-                <a:gradFill rotWithShape="1">
-                  <a:gsLst>
-                    <a:gs pos="0">
-                      <a:srgbClr val="000000">
-                        <a:tint val="92000"/>
-                        <a:shade val="100000"/>
-                        <a:satMod val="150000"/>
-                      </a:srgbClr>
-                    </a:gs>
-                    <a:gs pos="49000">
-                      <a:srgbClr val="000000">
-                        <a:tint val="89000"/>
-                        <a:shade val="90000"/>
-                        <a:satMod val="150000"/>
-                      </a:srgbClr>
-                    </a:gs>
-                    <a:gs pos="50000">
-                      <a:srgbClr val="000000">
-                        <a:tint val="100000"/>
-                        <a:shade val="75000"/>
-                        <a:satMod val="150000"/>
-                      </a:srgbClr>
-                    </a:gs>
-                    <a:gs pos="95000">
-                      <a:srgbClr val="000000">
-                        <a:shade val="47000"/>
-                        <a:satMod val="150000"/>
-                      </a:srgbClr>
-                    </a:gs>
-                    <a:gs pos="100000">
-                      <a:srgbClr val="000000">
-                        <a:shade val="39000"/>
-                        <a:satMod val="150000"/>
-                      </a:srgbClr>
-                    </a:gs>
-                  </a:gsLst>
-                  <a:lin ang="5400000"/>
-                </a:gradFill>
-                <a:effectLst>
-                  <a:outerShdw blurRad="50800" algn="tl" rotWithShape="0">
-                    <a:srgbClr val="000000"/>
-                  </a:outerShdw>
-                </a:effectLst>
-              </a:endParaRPr>
-            </a:p>
-          </p:txBody>
-        </p:sp>
-        <p:sp>
-          <p:nvSpPr>
-            <p:cNvPr id="5" name="Rectangle 4"/>
-            <p:cNvSpPr/>
-            <p:nvPr/>
-          </p:nvSpPr>
-          <p:spPr>
-            <a:xfrm>
-              <a:off x="5524861" y="1892300"/>
+              <a:off x="1777992" y="1694639"/>
               <a:ext cx="2514600" cy="277177"/>
             </a:xfrm>
             <a:prstGeom prst="rect">
@@ -10007,13 +9897,13 @@
         </p:sp>
         <p:sp>
           <p:nvSpPr>
-            <p:cNvPr id="51" name="Rectangle 50"/>
+            <p:cNvPr id="20" name="Rectangle 19"/>
             <p:cNvSpPr/>
             <p:nvPr/>
           </p:nvSpPr>
           <p:spPr>
             <a:xfrm>
-              <a:off x="5518063" y="1860186"/>
+              <a:off x="1771194" y="1662525"/>
               <a:ext cx="2521397" cy="316089"/>
             </a:xfrm>
             <a:prstGeom prst="rect">
@@ -10090,13 +9980,13 @@
         </p:sp>
         <p:sp>
           <p:nvSpPr>
-            <p:cNvPr id="53" name="Rectangle 52"/>
+            <p:cNvPr id="21" name="Rectangle 20"/>
             <p:cNvSpPr/>
             <p:nvPr/>
           </p:nvSpPr>
           <p:spPr>
             <a:xfrm>
-              <a:off x="5585464" y="1930330"/>
+              <a:off x="1838595" y="1732669"/>
               <a:ext cx="137573" cy="166535"/>
             </a:xfrm>
             <a:prstGeom prst="rect">
@@ -10158,13 +10048,13 @@
         </p:sp>
         <p:grpSp>
           <p:nvGrpSpPr>
-            <p:cNvPr id="7" name="Group 6"/>
+            <p:cNvPr id="22" name="Group 21"/>
             <p:cNvGrpSpPr/>
             <p:nvPr/>
           </p:nvGrpSpPr>
           <p:grpSpPr>
             <a:xfrm>
-              <a:off x="5786844" y="1844596"/>
+              <a:off x="2039975" y="1646935"/>
               <a:ext cx="13378" cy="311926"/>
               <a:chOff x="6155489" y="1844596"/>
               <a:chExt cx="13378" cy="311926"/>
@@ -10172,7 +10062,7 @@
           </p:grpSpPr>
           <p:cxnSp>
             <p:nvCxnSpPr>
-              <p:cNvPr id="61" name="Straight Connector 60"/>
+              <p:cNvPr id="23" name="Straight Connector 22"/>
               <p:cNvCxnSpPr/>
               <p:nvPr/>
             </p:nvCxnSpPr>
@@ -10209,7 +10099,7 @@
           </p:cxnSp>
           <p:cxnSp>
             <p:nvCxnSpPr>
-              <p:cNvPr id="62" name="Straight Connector 61"/>
+              <p:cNvPr id="24" name="Straight Connector 23"/>
               <p:cNvCxnSpPr/>
               <p:nvPr/>
             </p:nvCxnSpPr>
@@ -10247,13 +10137,13 @@
         </p:grpSp>
         <p:sp>
           <p:nvSpPr>
-            <p:cNvPr id="9" name="Dodecagon 8"/>
+            <p:cNvPr id="25" name="Dodecagon 24"/>
             <p:cNvSpPr/>
             <p:nvPr/>
           </p:nvSpPr>
           <p:spPr>
             <a:xfrm>
-              <a:off x="7818774" y="1898992"/>
+              <a:off x="4071905" y="1701331"/>
               <a:ext cx="197510" cy="214579"/>
             </a:xfrm>
             <a:prstGeom prst="dodecagon">
@@ -10305,302 +10195,86 @@
             </a:p>
           </p:txBody>
         </p:sp>
+        <p:sp>
+          <p:nvSpPr>
+            <p:cNvPr id="26" name="Rectangle 25"/>
+            <p:cNvSpPr/>
+            <p:nvPr/>
+          </p:nvSpPr>
+          <p:spPr>
+            <a:xfrm>
+              <a:off x="2423488" y="1077750"/>
+              <a:ext cx="1216807" cy="584775"/>
+            </a:xfrm>
+            <a:prstGeom prst="rect">
+              <a:avLst/>
+            </a:prstGeom>
+            <a:noFill/>
+          </p:spPr>
+          <p:txBody>
+            <a:bodyPr wrap="none" lIns="91440" tIns="45720" rIns="91440" bIns="45720">
+              <a:spAutoFit/>
+            </a:bodyPr>
+            <a:lstStyle/>
+            <a:p>
+              <a:pPr algn="ctr"/>
+              <a:r>
+                <a:rPr lang="en-US" sz="3200" b="1" dirty="0" err="1" smtClean="0">
+                  <a:ln w="12700">
+                    <a:solidFill>
+                      <a:schemeClr val="tx2">
+                        <a:satMod val="155000"/>
+                      </a:schemeClr>
+                    </a:solidFill>
+                    <a:prstDash val="solid"/>
+                  </a:ln>
+                  <a:solidFill>
+                    <a:schemeClr val="bg2">
+                      <a:tint val="85000"/>
+                      <a:satMod val="155000"/>
+                    </a:schemeClr>
+                  </a:solidFill>
+                  <a:effectLst>
+                    <a:outerShdw blurRad="41275" dist="20320" dir="1800000" algn="tl" rotWithShape="0">
+                      <a:srgbClr val="000000">
+                        <a:alpha val="40000"/>
+                      </a:srgbClr>
+                    </a:outerShdw>
+                  </a:effectLst>
+                </a:rPr>
+                <a:t>ToDos</a:t>
+              </a:r>
+              <a:endParaRPr lang="en-US" sz="3200" b="1" dirty="0">
+                <a:ln w="12700">
+                  <a:solidFill>
+                    <a:schemeClr val="tx2">
+                      <a:satMod val="155000"/>
+                    </a:schemeClr>
+                  </a:solidFill>
+                  <a:prstDash val="solid"/>
+                </a:ln>
+                <a:solidFill>
+                  <a:schemeClr val="bg2">
+                    <a:tint val="85000"/>
+                    <a:satMod val="155000"/>
+                  </a:schemeClr>
+                </a:solidFill>
+                <a:effectLst>
+                  <a:outerShdw blurRad="41275" dist="20320" dir="1800000" algn="tl" rotWithShape="0">
+                    <a:srgbClr val="000000">
+                      <a:alpha val="40000"/>
+                    </a:srgbClr>
+                  </a:outerShdw>
+                </a:effectLst>
+              </a:endParaRPr>
+            </a:p>
+          </p:txBody>
+        </p:sp>
       </p:grpSp>
-      <p:sp>
-        <p:nvSpPr>
-          <p:cNvPr id="20" name="TextBox 19"/>
-          <p:cNvSpPr txBox="1"/>
-          <p:nvPr/>
-        </p:nvSpPr>
-        <p:spPr>
-          <a:xfrm>
-            <a:off x="512064" y="709574"/>
-            <a:ext cx="4059936" cy="276999"/>
-          </a:xfrm>
-          <a:prstGeom prst="rect">
-            <a:avLst/>
-          </a:prstGeom>
-          <a:noFill/>
-        </p:spPr>
-        <p:txBody>
-          <a:bodyPr wrap="square" rtlCol="0">
-            <a:spAutoFit/>
-          </a:bodyPr>
-          <a:lstStyle/>
-          <a:p>
-            <a:r>
-              <a:rPr lang="en-US" sz="1200" dirty="0" smtClean="0">
-                <a:latin typeface="Times New Roman" panose="02020603050405020304" pitchFamily="18" charset="0"/>
-                <a:cs typeface="Times New Roman" panose="02020603050405020304" pitchFamily="18" charset="0"/>
-              </a:rPr>
-              <a:t>Task input line. Multi-line tasks are accepted.</a:t>
-            </a:r>
-            <a:endParaRPr lang="en-US" sz="1200" dirty="0">
-              <a:latin typeface="Times New Roman" panose="02020603050405020304" pitchFamily="18" charset="0"/>
-              <a:cs typeface="Times New Roman" panose="02020603050405020304" pitchFamily="18" charset="0"/>
-            </a:endParaRPr>
-          </a:p>
-        </p:txBody>
-      </p:sp>
-      <p:sp>
-        <p:nvSpPr>
-          <p:cNvPr id="21" name="Dodecagon 20"/>
-          <p:cNvSpPr/>
-          <p:nvPr/>
-        </p:nvSpPr>
-        <p:spPr>
-          <a:xfrm>
-            <a:off x="187746" y="740783"/>
-            <a:ext cx="197510" cy="214579"/>
-          </a:xfrm>
-          <a:prstGeom prst="dodecagon">
-            <a:avLst/>
-          </a:prstGeom>
-          <a:solidFill>
-            <a:srgbClr val="B4B4B4"/>
-          </a:solidFill>
-          <a:ln>
-            <a:solidFill>
-              <a:schemeClr val="bg1"/>
-            </a:solidFill>
-          </a:ln>
-        </p:spPr>
-        <p:style>
-          <a:lnRef idx="2">
-            <a:schemeClr val="accent1">
-              <a:shade val="50000"/>
-            </a:schemeClr>
-          </a:lnRef>
-          <a:fillRef idx="1">
-            <a:schemeClr val="accent1"/>
-          </a:fillRef>
-          <a:effectRef idx="0">
-            <a:schemeClr val="accent1"/>
-          </a:effectRef>
-          <a:fontRef idx="minor">
-            <a:schemeClr val="lt1"/>
-          </a:fontRef>
-        </p:style>
-        <p:txBody>
-          <a:bodyPr rtlCol="0" anchor="ctr"/>
-          <a:lstStyle/>
-          <a:p>
-            <a:pPr algn="ctr"/>
-            <a:r>
-              <a:rPr lang="en-US" dirty="0" smtClean="0">
-                <a:solidFill>
-                  <a:schemeClr val="bg1"/>
-                </a:solidFill>
-              </a:rPr>
-              <a:t>1</a:t>
-            </a:r>
-            <a:endParaRPr lang="en-US" dirty="0">
-              <a:solidFill>
-                <a:schemeClr val="bg1"/>
-              </a:solidFill>
-            </a:endParaRPr>
-          </a:p>
-        </p:txBody>
-      </p:sp>
-      <p:sp>
-        <p:nvSpPr>
-          <p:cNvPr id="22" name="TextBox 21"/>
-          <p:cNvSpPr txBox="1"/>
-          <p:nvPr/>
-        </p:nvSpPr>
-        <p:spPr>
-          <a:xfrm>
-            <a:off x="518164" y="1015589"/>
-            <a:ext cx="4059936" cy="461665"/>
-          </a:xfrm>
-          <a:prstGeom prst="rect">
-            <a:avLst/>
-          </a:prstGeom>
-          <a:noFill/>
-        </p:spPr>
-        <p:txBody>
-          <a:bodyPr wrap="square" rtlCol="0">
-            <a:spAutoFit/>
-          </a:bodyPr>
-          <a:lstStyle/>
-          <a:p>
-            <a:r>
-              <a:rPr lang="en-US" sz="1200" dirty="0" smtClean="0">
-                <a:latin typeface="Times New Roman" panose="02020603050405020304" pitchFamily="18" charset="0"/>
-                <a:cs typeface="Times New Roman" panose="02020603050405020304" pitchFamily="18" charset="0"/>
-              </a:rPr>
-              <a:t>Keyboard appears when touch anywhere on task input line.</a:t>
-            </a:r>
-          </a:p>
-          <a:p>
-            <a:r>
-              <a:rPr lang="en-US" sz="1200" dirty="0" smtClean="0">
-                <a:latin typeface="Times New Roman" panose="02020603050405020304" pitchFamily="18" charset="0"/>
-                <a:cs typeface="Times New Roman" panose="02020603050405020304" pitchFamily="18" charset="0"/>
-              </a:rPr>
-              <a:t>Cursor is placed at beginning of input line.</a:t>
-            </a:r>
-            <a:endParaRPr lang="en-US" sz="1200" dirty="0">
-              <a:latin typeface="Times New Roman" panose="02020603050405020304" pitchFamily="18" charset="0"/>
-              <a:cs typeface="Times New Roman" panose="02020603050405020304" pitchFamily="18" charset="0"/>
-            </a:endParaRPr>
-          </a:p>
-        </p:txBody>
-      </p:sp>
-      <p:sp>
-        <p:nvSpPr>
-          <p:cNvPr id="23" name="Dodecagon 22"/>
-          <p:cNvSpPr/>
-          <p:nvPr/>
-        </p:nvSpPr>
-        <p:spPr>
-          <a:xfrm>
-            <a:off x="193846" y="1046798"/>
-            <a:ext cx="197510" cy="214579"/>
-          </a:xfrm>
-          <a:prstGeom prst="dodecagon">
-            <a:avLst/>
-          </a:prstGeom>
-          <a:solidFill>
-            <a:srgbClr val="B4B4B4"/>
-          </a:solidFill>
-          <a:ln>
-            <a:solidFill>
-              <a:schemeClr val="bg1"/>
-            </a:solidFill>
-          </a:ln>
-        </p:spPr>
-        <p:style>
-          <a:lnRef idx="2">
-            <a:schemeClr val="accent1">
-              <a:shade val="50000"/>
-            </a:schemeClr>
-          </a:lnRef>
-          <a:fillRef idx="1">
-            <a:schemeClr val="accent1"/>
-          </a:fillRef>
-          <a:effectRef idx="0">
-            <a:schemeClr val="accent1"/>
-          </a:effectRef>
-          <a:fontRef idx="minor">
-            <a:schemeClr val="lt1"/>
-          </a:fontRef>
-        </p:style>
-        <p:txBody>
-          <a:bodyPr rtlCol="0" anchor="ctr"/>
-          <a:lstStyle/>
-          <a:p>
-            <a:pPr algn="ctr"/>
-            <a:r>
-              <a:rPr lang="en-US" dirty="0" smtClean="0">
-                <a:solidFill>
-                  <a:schemeClr val="bg1"/>
-                </a:solidFill>
-              </a:rPr>
-              <a:t>2</a:t>
-            </a:r>
-            <a:endParaRPr lang="en-US" dirty="0">
-              <a:solidFill>
-                <a:schemeClr val="bg1"/>
-              </a:solidFill>
-            </a:endParaRPr>
-          </a:p>
-        </p:txBody>
-      </p:sp>
-      <p:pic>
-        <p:nvPicPr>
-          <p:cNvPr id="24" name="Picture 23"/>
-          <p:cNvPicPr>
-            <a:picLocks noChangeAspect="1"/>
-          </p:cNvPicPr>
-          <p:nvPr/>
-        </p:nvPicPr>
-        <p:blipFill>
-          <a:blip r:embed="rId3">
-            <a:extLst>
-              <a:ext uri="{28A0092B-C50C-407E-A947-70E740481C1C}">
-                <a14:useLocalDpi xmlns:a14="http://schemas.microsoft.com/office/drawing/2010/main" val="0"/>
-              </a:ext>
-            </a:extLst>
-          </a:blip>
-          <a:stretch>
-            <a:fillRect/>
-          </a:stretch>
-        </p:blipFill>
-        <p:spPr>
-          <a:xfrm>
-            <a:off x="5423963" y="3965785"/>
-            <a:ext cx="2689625" cy="1798388"/>
-          </a:xfrm>
-          <a:prstGeom prst="rect">
-            <a:avLst/>
-          </a:prstGeom>
-        </p:spPr>
-      </p:pic>
-      <p:sp>
-        <p:nvSpPr>
-          <p:cNvPr id="25" name="Dodecagon 24"/>
-          <p:cNvSpPr/>
-          <p:nvPr/>
-        </p:nvSpPr>
-        <p:spPr>
-          <a:xfrm>
-            <a:off x="5512142" y="3761358"/>
-            <a:ext cx="197510" cy="214579"/>
-          </a:xfrm>
-          <a:prstGeom prst="dodecagon">
-            <a:avLst/>
-          </a:prstGeom>
-          <a:solidFill>
-            <a:srgbClr val="B4B4B4"/>
-          </a:solidFill>
-          <a:ln>
-            <a:solidFill>
-              <a:schemeClr val="bg1"/>
-            </a:solidFill>
-          </a:ln>
-        </p:spPr>
-        <p:style>
-          <a:lnRef idx="2">
-            <a:schemeClr val="accent1">
-              <a:shade val="50000"/>
-            </a:schemeClr>
-          </a:lnRef>
-          <a:fillRef idx="1">
-            <a:schemeClr val="accent1"/>
-          </a:fillRef>
-          <a:effectRef idx="0">
-            <a:schemeClr val="accent1"/>
-          </a:effectRef>
-          <a:fontRef idx="minor">
-            <a:schemeClr val="lt1"/>
-          </a:fontRef>
-        </p:style>
-        <p:txBody>
-          <a:bodyPr rtlCol="0" anchor="ctr"/>
-          <a:lstStyle/>
-          <a:p>
-            <a:pPr algn="ctr"/>
-            <a:r>
-              <a:rPr lang="en-US" dirty="0" smtClean="0">
-                <a:solidFill>
-                  <a:schemeClr val="bg1"/>
-                </a:solidFill>
-              </a:rPr>
-              <a:t>2</a:t>
-            </a:r>
-            <a:endParaRPr lang="en-US" dirty="0">
-              <a:solidFill>
-                <a:schemeClr val="bg1"/>
-              </a:solidFill>
-            </a:endParaRPr>
-          </a:p>
-        </p:txBody>
-      </p:sp>
     </p:spTree>
     <p:extLst>
       <p:ext uri="{BB962C8B-B14F-4D97-AF65-F5344CB8AC3E}">
-        <p14:creationId xmlns:p14="http://schemas.microsoft.com/office/powerpoint/2010/main" val="2246918411"/>
+        <p14:creationId xmlns:p14="http://schemas.microsoft.com/office/powerpoint/2010/main" val="2472442603"/>
       </p:ext>
     </p:extLst>
   </p:cSld>

</xml_diff>